<commit_message>
Updating Lesson 2 and Lesson 3 slides.
</commit_message>
<xml_diff>
--- a/notes/L3/Lsn3.pptx
+++ b/notes/L3/Lsn3.pptx
@@ -4686,7 +4686,33 @@
                 </a:solidFill>
                 <a:hlinkClick r:id="rId5"/>
               </a:rPr>
-              <a:t>Assignment 1 due next lesson</a:t>
+              <a:t>Assignment 1 due next </a:t>
+            </a:r>
+            <a:r>
+              <a:rPr lang="en-US" sz="2000" dirty="0" smtClean="0">
+                <a:solidFill>
+                  <a:srgbClr val="0070C0"/>
+                </a:solidFill>
+                <a:hlinkClick r:id="rId5"/>
+              </a:rPr>
+              <a:t>lesson</a:t>
+            </a:r>
+            <a:endParaRPr lang="en-US" sz="2000" dirty="0" smtClean="0">
+              <a:solidFill>
+                <a:srgbClr val="0070C0"/>
+              </a:solidFill>
+            </a:endParaRPr>
+          </a:p>
+          <a:p>
+            <a:pPr lvl="1" algn="l"/>
+            <a:r>
+              <a:rPr lang="en-US" sz="2000" dirty="0" smtClean="0">
+                <a:solidFill>
+                  <a:srgbClr val="0070C0"/>
+                </a:solidFill>
+                <a:hlinkClick r:id="rId6"/>
+              </a:rPr>
+              <a:t>uCorrupt1 due next lesson</a:t>
             </a:r>
             <a:endParaRPr lang="en-US" sz="2000" dirty="0" smtClean="0">
               <a:solidFill>
@@ -13701,7 +13727,11 @@
             </a:pPr>
             <a:r>
               <a:rPr lang="en-US" sz="2400" dirty="0" smtClean="0"/>
-              <a:t>STX  r10</a:t>
+              <a:t>SXT  </a:t>
+            </a:r>
+            <a:r>
+              <a:rPr lang="en-US" sz="2400" dirty="0" smtClean="0"/>
+              <a:t>r10</a:t>
             </a:r>
             <a:endParaRPr lang="en-US" sz="2400" dirty="0"/>
           </a:p>
@@ -21858,7 +21888,7 @@
                     <a:p>
                       <a:pPr algn="l" fontAlgn="t"/>
                       <a:r>
-                        <a:rPr lang="en-US" sz="1600">
+                        <a:rPr lang="en-US" sz="1600" dirty="0">
                           <a:effectLst/>
                         </a:rPr>
                         <a:t>@Rn</a:t>
@@ -22028,7 +22058,7 @@
                     <a:p>
                       <a:pPr algn="l" fontAlgn="t"/>
                       <a:r>
-                        <a:rPr lang="en-US" sz="1600">
+                        <a:rPr lang="en-US" sz="1600" dirty="0">
                           <a:effectLst/>
                         </a:rPr>
                         <a:t>@Rn+</a:t>

</xml_diff>

<commit_message>
Updating Lecture 3 slides yet again with more detail
</commit_message>
<xml_diff>
--- a/notes/L3/Lsn3.pptx
+++ b/notes/L3/Lsn3.pptx
@@ -7108,6 +7108,125 @@
           </a:graphicData>
         </a:graphic>
       </p:graphicFrame>
+      <p:pic>
+        <p:nvPicPr>
+          <p:cNvPr id="1026" name="Picture 2"/>
+          <p:cNvPicPr>
+            <a:picLocks noChangeAspect="1" noChangeArrowheads="1"/>
+          </p:cNvPicPr>
+          <p:nvPr/>
+        </p:nvPicPr>
+        <p:blipFill>
+          <a:blip r:embed="rId2">
+            <a:extLst>
+              <a:ext uri="{28A0092B-C50C-407E-A947-70E740481C1C}">
+                <a14:useLocalDpi xmlns:a14="http://schemas.microsoft.com/office/drawing/2010/main" val="0"/>
+              </a:ext>
+            </a:extLst>
+          </a:blip>
+          <a:srcRect/>
+          <a:stretch>
+            <a:fillRect/>
+          </a:stretch>
+        </p:blipFill>
+        <p:spPr bwMode="auto">
+          <a:xfrm>
+            <a:off x="4216400" y="5754776"/>
+            <a:ext cx="4927600" cy="1010620"/>
+          </a:xfrm>
+          <a:prstGeom prst="rect">
+            <a:avLst/>
+          </a:prstGeom>
+          <a:noFill/>
+          <a:ln>
+            <a:noFill/>
+          </a:ln>
+          <a:extLst>
+            <a:ext uri="{909E8E84-426E-40DD-AFC4-6F175D3DCCD1}">
+              <a14:hiddenFill xmlns:a14="http://schemas.microsoft.com/office/drawing/2010/main">
+                <a:solidFill>
+                  <a:schemeClr val="accent1"/>
+                </a:solidFill>
+              </a14:hiddenFill>
+            </a:ext>
+            <a:ext uri="{91240B29-F687-4F45-9708-019B960494DF}">
+              <a14:hiddenLine xmlns:a14="http://schemas.microsoft.com/office/drawing/2010/main" w="9525">
+                <a:solidFill>
+                  <a:schemeClr val="tx1"/>
+                </a:solidFill>
+                <a:miter lim="800000"/>
+                <a:headEnd/>
+                <a:tailEnd/>
+              </a14:hiddenLine>
+            </a:ext>
+          </a:extLst>
+        </p:spPr>
+      </p:pic>
+      <p:sp>
+        <p:nvSpPr>
+          <p:cNvPr id="3" name="Rectangle 2"/>
+          <p:cNvSpPr/>
+          <p:nvPr/>
+        </p:nvSpPr>
+        <p:spPr bwMode="auto">
+          <a:xfrm>
+            <a:off x="7128933" y="6002867"/>
+            <a:ext cx="2015067" cy="762529"/>
+          </a:xfrm>
+          <a:prstGeom prst="rect">
+            <a:avLst/>
+          </a:prstGeom>
+          <a:noFill/>
+          <a:ln w="28575" cap="flat" cmpd="sng" algn="ctr">
+            <a:solidFill>
+              <a:srgbClr val="FF0000"/>
+            </a:solidFill>
+            <a:prstDash val="solid"/>
+            <a:round/>
+            <a:headEnd type="none" w="med" len="med"/>
+            <a:tailEnd type="none" w="med" len="med"/>
+          </a:ln>
+          <a:effectLst/>
+        </p:spPr>
+        <p:txBody>
+          <a:bodyPr vert="horz" wrap="square" lIns="91440" tIns="45720" rIns="91440" bIns="45720" numCol="1" rtlCol="0" anchor="t" anchorCtr="0" compatLnSpc="1">
+            <a:prstTxWarp prst="textNoShape">
+              <a:avLst/>
+            </a:prstTxWarp>
+            <a:spAutoFit/>
+          </a:bodyPr>
+          <a:lstStyle/>
+          <a:p>
+            <a:pPr marL="0" marR="0" indent="0" algn="l" defTabSz="914400" rtl="0" eaLnBrk="1" fontAlgn="base" latinLnBrk="0" hangingPunct="1">
+              <a:lnSpc>
+                <a:spcPct val="100000"/>
+              </a:lnSpc>
+              <a:spcBef>
+                <a:spcPct val="50000"/>
+              </a:spcBef>
+              <a:spcAft>
+                <a:spcPct val="0"/>
+              </a:spcAft>
+              <a:buClrTx/>
+              <a:buSzTx/>
+              <a:buFontTx/>
+              <a:buNone/>
+              <a:tabLst/>
+            </a:pPr>
+            <a:endParaRPr kumimoji="0" lang="en-US" sz="2400" b="0" i="0" u="none" strike="noStrike" cap="none" normalizeH="0" baseline="0" smtClean="0">
+              <a:ln>
+                <a:noFill/>
+              </a:ln>
+              <a:solidFill>
+                <a:schemeClr val="tx1"/>
+              </a:solidFill>
+              <a:effectLst/>
+              <a:latin typeface="Times New Roman" pitchFamily="18" charset="0"/>
+              <a:sym typeface="Wingdings" pitchFamily="2" charset="2"/>
+            </a:endParaRPr>
+          </a:p>
+        </p:txBody>
+      </p:sp>
     </p:spTree>
     <p:extLst>
       <p:ext uri="{BB962C8B-B14F-4D97-AF65-F5344CB8AC3E}">
@@ -10726,6 +10845,302 @@
           </a:p>
         </p:txBody>
       </p:sp>
+      <p:sp>
+        <p:nvSpPr>
+          <p:cNvPr id="3" name="Rounded Rectangular Callout 2"/>
+          <p:cNvSpPr/>
+          <p:nvPr/>
+        </p:nvSpPr>
+        <p:spPr bwMode="auto">
+          <a:xfrm>
+            <a:off x="1418602" y="5691499"/>
+            <a:ext cx="931491" cy="510778"/>
+          </a:xfrm>
+          <a:prstGeom prst="wedgeRoundRectCallout">
+            <a:avLst>
+              <a:gd name="adj1" fmla="val 79167"/>
+              <a:gd name="adj2" fmla="val 111020"/>
+              <a:gd name="adj3" fmla="val 16667"/>
+            </a:avLst>
+          </a:prstGeom>
+          <a:solidFill>
+            <a:srgbClr val="FFFF00"/>
+          </a:solidFill>
+          <a:ln w="9525" cap="flat" cmpd="sng" algn="ctr">
+            <a:noFill/>
+            <a:prstDash val="solid"/>
+            <a:round/>
+            <a:headEnd type="none" w="med" len="med"/>
+            <a:tailEnd type="none" w="med" len="med"/>
+          </a:ln>
+          <a:effectLst/>
+        </p:spPr>
+        <p:txBody>
+          <a:bodyPr vert="horz" wrap="square" lIns="91440" tIns="45720" rIns="91440" bIns="45720" numCol="1" rtlCol="0" anchor="t" anchorCtr="0" compatLnSpc="1">
+            <a:prstTxWarp prst="textNoShape">
+              <a:avLst/>
+            </a:prstTxWarp>
+            <a:spAutoFit/>
+          </a:bodyPr>
+          <a:lstStyle/>
+          <a:p>
+            <a:pPr marL="0" marR="0" indent="0" algn="l" defTabSz="914400" rtl="0" eaLnBrk="1" fontAlgn="base" latinLnBrk="0" hangingPunct="1">
+              <a:lnSpc>
+                <a:spcPct val="100000"/>
+              </a:lnSpc>
+              <a:spcBef>
+                <a:spcPct val="50000"/>
+              </a:spcBef>
+              <a:spcAft>
+                <a:spcPct val="0"/>
+              </a:spcAft>
+              <a:buClrTx/>
+              <a:buSzTx/>
+              <a:buFontTx/>
+              <a:buNone/>
+              <a:tabLst/>
+            </a:pPr>
+            <a:r>
+              <a:rPr kumimoji="0" lang="en-US" sz="2400" b="0" i="0" u="none" strike="noStrike" cap="none" normalizeH="0" baseline="0" dirty="0" smtClean="0">
+                <a:ln>
+                  <a:noFill/>
+                </a:ln>
+                <a:solidFill>
+                  <a:schemeClr val="tx1"/>
+                </a:solidFill>
+                <a:effectLst/>
+                <a:latin typeface="Times New Roman" pitchFamily="18" charset="0"/>
+                <a:sym typeface="Wingdings" pitchFamily="2" charset="2"/>
+              </a:rPr>
+              <a:t>Hex</a:t>
+            </a:r>
+          </a:p>
+        </p:txBody>
+      </p:sp>
+      <p:sp>
+        <p:nvSpPr>
+          <p:cNvPr id="7" name="Rounded Rectangular Callout 6"/>
+          <p:cNvSpPr/>
+          <p:nvPr/>
+        </p:nvSpPr>
+        <p:spPr bwMode="auto">
+          <a:xfrm>
+            <a:off x="7766702" y="5681090"/>
+            <a:ext cx="1377298" cy="510778"/>
+          </a:xfrm>
+          <a:prstGeom prst="wedgeRoundRectCallout">
+            <a:avLst>
+              <a:gd name="adj1" fmla="val -111319"/>
+              <a:gd name="adj2" fmla="val 112693"/>
+              <a:gd name="adj3" fmla="val 16667"/>
+            </a:avLst>
+          </a:prstGeom>
+          <a:solidFill>
+            <a:srgbClr val="FFFF00"/>
+          </a:solidFill>
+          <a:ln w="9525" cap="flat" cmpd="sng" algn="ctr">
+            <a:noFill/>
+            <a:prstDash val="solid"/>
+            <a:round/>
+            <a:headEnd type="none" w="med" len="med"/>
+            <a:tailEnd type="none" w="med" len="med"/>
+          </a:ln>
+          <a:effectLst/>
+        </p:spPr>
+        <p:txBody>
+          <a:bodyPr vert="horz" wrap="square" lIns="91440" tIns="45720" rIns="91440" bIns="45720" numCol="1" rtlCol="0" anchor="t" anchorCtr="0" compatLnSpc="1">
+            <a:prstTxWarp prst="textNoShape">
+              <a:avLst/>
+            </a:prstTxWarp>
+            <a:spAutoFit/>
+          </a:bodyPr>
+          <a:lstStyle/>
+          <a:p>
+            <a:pPr marL="0" marR="0" indent="0" algn="l" defTabSz="914400" rtl="0" eaLnBrk="1" fontAlgn="base" latinLnBrk="0" hangingPunct="1">
+              <a:lnSpc>
+                <a:spcPct val="100000"/>
+              </a:lnSpc>
+              <a:spcBef>
+                <a:spcPct val="50000"/>
+              </a:spcBef>
+              <a:spcAft>
+                <a:spcPct val="0"/>
+              </a:spcAft>
+              <a:buClrTx/>
+              <a:buSzTx/>
+              <a:buFontTx/>
+              <a:buNone/>
+              <a:tabLst/>
+            </a:pPr>
+            <a:r>
+              <a:rPr kumimoji="0" lang="en-US" sz="2400" b="0" i="0" u="none" strike="noStrike" cap="none" normalizeH="0" baseline="0" dirty="0" smtClean="0">
+                <a:ln>
+                  <a:noFill/>
+                </a:ln>
+                <a:solidFill>
+                  <a:schemeClr val="tx1"/>
+                </a:solidFill>
+                <a:effectLst/>
+                <a:latin typeface="Times New Roman" pitchFamily="18" charset="0"/>
+                <a:sym typeface="Wingdings" pitchFamily="2" charset="2"/>
+              </a:rPr>
+              <a:t>Decimal</a:t>
+            </a:r>
+          </a:p>
+        </p:txBody>
+      </p:sp>
+      <p:sp>
+        <p:nvSpPr>
+          <p:cNvPr id="5" name="Rectangle 4"/>
+          <p:cNvSpPr/>
+          <p:nvPr/>
+        </p:nvSpPr>
+        <p:spPr bwMode="auto">
+          <a:xfrm>
+            <a:off x="2555061" y="6400800"/>
+            <a:ext cx="658158" cy="239282"/>
+          </a:xfrm>
+          <a:prstGeom prst="rect">
+            <a:avLst/>
+          </a:prstGeom>
+          <a:noFill/>
+          <a:ln>
+            <a:solidFill>
+              <a:srgbClr val="FFFF00"/>
+            </a:solidFill>
+            <a:headEnd type="none" w="med" len="med"/>
+            <a:tailEnd type="none" w="med" len="med"/>
+          </a:ln>
+        </p:spPr>
+        <p:style>
+          <a:lnRef idx="2">
+            <a:schemeClr val="accent4"/>
+          </a:lnRef>
+          <a:fillRef idx="1">
+            <a:schemeClr val="lt1"/>
+          </a:fillRef>
+          <a:effectRef idx="0">
+            <a:schemeClr val="accent4"/>
+          </a:effectRef>
+          <a:fontRef idx="minor">
+            <a:schemeClr val="dk1"/>
+          </a:fontRef>
+        </p:style>
+        <p:txBody>
+          <a:bodyPr vert="horz" wrap="square" lIns="91440" tIns="45720" rIns="91440" bIns="45720" numCol="1" rtlCol="0" anchor="t" anchorCtr="0" compatLnSpc="1">
+            <a:prstTxWarp prst="textNoShape">
+              <a:avLst/>
+            </a:prstTxWarp>
+            <a:spAutoFit/>
+          </a:bodyPr>
+          <a:lstStyle/>
+          <a:p>
+            <a:pPr marL="0" marR="0" indent="0" algn="l" defTabSz="914400" rtl="0" eaLnBrk="1" fontAlgn="base" latinLnBrk="0" hangingPunct="1">
+              <a:lnSpc>
+                <a:spcPct val="100000"/>
+              </a:lnSpc>
+              <a:spcBef>
+                <a:spcPct val="50000"/>
+              </a:spcBef>
+              <a:spcAft>
+                <a:spcPct val="0"/>
+              </a:spcAft>
+              <a:buClrTx/>
+              <a:buSzTx/>
+              <a:buFontTx/>
+              <a:buNone/>
+              <a:tabLst/>
+            </a:pPr>
+            <a:endParaRPr kumimoji="0" lang="en-US" sz="2400" b="0" i="0" u="none" strike="noStrike" cap="none" normalizeH="0" baseline="0" smtClean="0">
+              <a:ln>
+                <a:noFill/>
+              </a:ln>
+              <a:solidFill>
+                <a:schemeClr val="tx1"/>
+              </a:solidFill>
+              <a:effectLst/>
+              <a:latin typeface="Times New Roman" pitchFamily="18" charset="0"/>
+              <a:sym typeface="Wingdings" pitchFamily="2" charset="2"/>
+            </a:endParaRPr>
+          </a:p>
+        </p:txBody>
+      </p:sp>
+      <p:sp>
+        <p:nvSpPr>
+          <p:cNvPr id="8" name="Rectangle 7"/>
+          <p:cNvSpPr/>
+          <p:nvPr/>
+        </p:nvSpPr>
+        <p:spPr bwMode="auto">
+          <a:xfrm>
+            <a:off x="6117233" y="6400800"/>
+            <a:ext cx="658158" cy="239282"/>
+          </a:xfrm>
+          <a:prstGeom prst="rect">
+            <a:avLst/>
+          </a:prstGeom>
+          <a:noFill/>
+          <a:ln>
+            <a:solidFill>
+              <a:srgbClr val="FFFF00"/>
+            </a:solidFill>
+            <a:headEnd type="none" w="med" len="med"/>
+            <a:tailEnd type="none" w="med" len="med"/>
+          </a:ln>
+        </p:spPr>
+        <p:style>
+          <a:lnRef idx="2">
+            <a:schemeClr val="accent4"/>
+          </a:lnRef>
+          <a:fillRef idx="1">
+            <a:schemeClr val="lt1"/>
+          </a:fillRef>
+          <a:effectRef idx="0">
+            <a:schemeClr val="accent4"/>
+          </a:effectRef>
+          <a:fontRef idx="minor">
+            <a:schemeClr val="dk1"/>
+          </a:fontRef>
+        </p:style>
+        <p:txBody>
+          <a:bodyPr vert="horz" wrap="square" lIns="91440" tIns="45720" rIns="91440" bIns="45720" numCol="1" rtlCol="0" anchor="t" anchorCtr="0" compatLnSpc="1">
+            <a:prstTxWarp prst="textNoShape">
+              <a:avLst/>
+            </a:prstTxWarp>
+            <a:spAutoFit/>
+          </a:bodyPr>
+          <a:lstStyle/>
+          <a:p>
+            <a:pPr marL="0" marR="0" indent="0" algn="l" defTabSz="914400" rtl="0" eaLnBrk="1" fontAlgn="base" latinLnBrk="0" hangingPunct="1">
+              <a:lnSpc>
+                <a:spcPct val="100000"/>
+              </a:lnSpc>
+              <a:spcBef>
+                <a:spcPct val="50000"/>
+              </a:spcBef>
+              <a:spcAft>
+                <a:spcPct val="0"/>
+              </a:spcAft>
+              <a:buClrTx/>
+              <a:buSzTx/>
+              <a:buFontTx/>
+              <a:buNone/>
+              <a:tabLst/>
+            </a:pPr>
+            <a:endParaRPr kumimoji="0" lang="en-US" sz="2400" b="0" i="0" u="none" strike="noStrike" cap="none" normalizeH="0" baseline="0" smtClean="0">
+              <a:ln>
+                <a:noFill/>
+              </a:ln>
+              <a:solidFill>
+                <a:schemeClr val="tx1"/>
+              </a:solidFill>
+              <a:effectLst/>
+              <a:latin typeface="Times New Roman" pitchFamily="18" charset="0"/>
+              <a:sym typeface="Wingdings" pitchFamily="2" charset="2"/>
+            </a:endParaRPr>
+          </a:p>
+        </p:txBody>
+      </p:sp>
     </p:spTree>
     <p:extLst>
       <p:ext uri="{BB962C8B-B14F-4D97-AF65-F5344CB8AC3E}">
@@ -10739,9 +11154,182 @@
   <p:timing>
     <p:tnLst>
       <p:par>
-        <p:cTn id="1" dur="indefinite" restart="never" nodeType="tmRoot"/>
+        <p:cTn id="1" dur="indefinite" restart="never" nodeType="tmRoot">
+          <p:childTnLst>
+            <p:seq concurrent="1" nextAc="seek">
+              <p:cTn id="2" dur="indefinite" nodeType="mainSeq">
+                <p:childTnLst>
+                  <p:par>
+                    <p:cTn id="3" fill="hold">
+                      <p:stCondLst>
+                        <p:cond delay="indefinite"/>
+                      </p:stCondLst>
+                      <p:childTnLst>
+                        <p:par>
+                          <p:cTn id="4" fill="hold">
+                            <p:stCondLst>
+                              <p:cond delay="0"/>
+                            </p:stCondLst>
+                            <p:childTnLst>
+                              <p:par>
+                                <p:cTn id="5" presetID="1" presetClass="entr" presetSubtype="0" fill="hold" grpId="0" nodeType="clickEffect">
+                                  <p:stCondLst>
+                                    <p:cond delay="0"/>
+                                  </p:stCondLst>
+                                  <p:childTnLst>
+                                    <p:set>
+                                      <p:cBhvr>
+                                        <p:cTn id="6" dur="1" fill="hold">
+                                          <p:stCondLst>
+                                            <p:cond delay="0"/>
+                                          </p:stCondLst>
+                                        </p:cTn>
+                                        <p:tgtEl>
+                                          <p:spTgt spid="7"/>
+                                        </p:tgtEl>
+                                        <p:attrNameLst>
+                                          <p:attrName>style.visibility</p:attrName>
+                                        </p:attrNameLst>
+                                      </p:cBhvr>
+                                      <p:to>
+                                        <p:strVal val="visible"/>
+                                      </p:to>
+                                    </p:set>
+                                  </p:childTnLst>
+                                </p:cTn>
+                              </p:par>
+                              <p:par>
+                                <p:cTn id="7" presetID="1" presetClass="entr" presetSubtype="0" fill="hold" grpId="0" nodeType="withEffect">
+                                  <p:stCondLst>
+                                    <p:cond delay="0"/>
+                                  </p:stCondLst>
+                                  <p:childTnLst>
+                                    <p:set>
+                                      <p:cBhvr>
+                                        <p:cTn id="8" dur="1" fill="hold">
+                                          <p:stCondLst>
+                                            <p:cond delay="0"/>
+                                          </p:stCondLst>
+                                        </p:cTn>
+                                        <p:tgtEl>
+                                          <p:spTgt spid="8"/>
+                                        </p:tgtEl>
+                                        <p:attrNameLst>
+                                          <p:attrName>style.visibility</p:attrName>
+                                        </p:attrNameLst>
+                                      </p:cBhvr>
+                                      <p:to>
+                                        <p:strVal val="visible"/>
+                                      </p:to>
+                                    </p:set>
+                                  </p:childTnLst>
+                                </p:cTn>
+                              </p:par>
+                            </p:childTnLst>
+                          </p:cTn>
+                        </p:par>
+                      </p:childTnLst>
+                    </p:cTn>
+                  </p:par>
+                  <p:par>
+                    <p:cTn id="9" fill="hold">
+                      <p:stCondLst>
+                        <p:cond delay="indefinite"/>
+                      </p:stCondLst>
+                      <p:childTnLst>
+                        <p:par>
+                          <p:cTn id="10" fill="hold">
+                            <p:stCondLst>
+                              <p:cond delay="0"/>
+                            </p:stCondLst>
+                            <p:childTnLst>
+                              <p:par>
+                                <p:cTn id="11" presetID="1" presetClass="entr" presetSubtype="0" fill="hold" grpId="0" nodeType="clickEffect">
+                                  <p:stCondLst>
+                                    <p:cond delay="0"/>
+                                  </p:stCondLst>
+                                  <p:childTnLst>
+                                    <p:set>
+                                      <p:cBhvr>
+                                        <p:cTn id="12" dur="1" fill="hold">
+                                          <p:stCondLst>
+                                            <p:cond delay="0"/>
+                                          </p:stCondLst>
+                                        </p:cTn>
+                                        <p:tgtEl>
+                                          <p:spTgt spid="3"/>
+                                        </p:tgtEl>
+                                        <p:attrNameLst>
+                                          <p:attrName>style.visibility</p:attrName>
+                                        </p:attrNameLst>
+                                      </p:cBhvr>
+                                      <p:to>
+                                        <p:strVal val="visible"/>
+                                      </p:to>
+                                    </p:set>
+                                  </p:childTnLst>
+                                </p:cTn>
+                              </p:par>
+                              <p:par>
+                                <p:cTn id="13" presetID="1" presetClass="entr" presetSubtype="0" fill="hold" grpId="0" nodeType="withEffect">
+                                  <p:stCondLst>
+                                    <p:cond delay="0"/>
+                                  </p:stCondLst>
+                                  <p:childTnLst>
+                                    <p:set>
+                                      <p:cBhvr>
+                                        <p:cTn id="14" dur="1" fill="hold">
+                                          <p:stCondLst>
+                                            <p:cond delay="0"/>
+                                          </p:stCondLst>
+                                        </p:cTn>
+                                        <p:tgtEl>
+                                          <p:spTgt spid="5"/>
+                                        </p:tgtEl>
+                                        <p:attrNameLst>
+                                          <p:attrName>style.visibility</p:attrName>
+                                        </p:attrNameLst>
+                                      </p:cBhvr>
+                                      <p:to>
+                                        <p:strVal val="visible"/>
+                                      </p:to>
+                                    </p:set>
+                                  </p:childTnLst>
+                                </p:cTn>
+                              </p:par>
+                            </p:childTnLst>
+                          </p:cTn>
+                        </p:par>
+                      </p:childTnLst>
+                    </p:cTn>
+                  </p:par>
+                </p:childTnLst>
+              </p:cTn>
+              <p:prevCondLst>
+                <p:cond evt="onPrev" delay="0">
+                  <p:tgtEl>
+                    <p:sldTgt/>
+                  </p:tgtEl>
+                </p:cond>
+              </p:prevCondLst>
+              <p:nextCondLst>
+                <p:cond evt="onNext" delay="0">
+                  <p:tgtEl>
+                    <p:sldTgt/>
+                  </p:tgtEl>
+                </p:cond>
+              </p:nextCondLst>
+            </p:seq>
+          </p:childTnLst>
+        </p:cTn>
       </p:par>
     </p:tnLst>
+    <p:bldLst>
+      <p:bldP spid="3" grpId="0" animBg="1"/>
+      <p:bldP spid="7" grpId="0" animBg="1"/>
+      <p:bldP spid="5" grpId="0" animBg="1"/>
+      <p:bldP spid="8" grpId="0" animBg="1"/>
+    </p:bldLst>
   </p:timing>
 </p:sld>
 </file>
@@ -11017,6 +11605,408 @@
           </a:p>
         </p:txBody>
       </p:sp>
+      <p:sp>
+        <p:nvSpPr>
+          <p:cNvPr id="3" name="Rectangle 2"/>
+          <p:cNvSpPr/>
+          <p:nvPr/>
+        </p:nvSpPr>
+        <p:spPr bwMode="auto">
+          <a:xfrm>
+            <a:off x="1320800" y="3048000"/>
+            <a:ext cx="3242733" cy="296333"/>
+          </a:xfrm>
+          <a:prstGeom prst="rect">
+            <a:avLst/>
+          </a:prstGeom>
+          <a:noFill/>
+          <a:ln w="19050" cap="flat" cmpd="sng" algn="ctr">
+            <a:solidFill>
+              <a:srgbClr val="FF0000"/>
+            </a:solidFill>
+            <a:prstDash val="solid"/>
+            <a:round/>
+            <a:headEnd type="none" w="med" len="med"/>
+            <a:tailEnd type="none" w="med" len="med"/>
+          </a:ln>
+          <a:effectLst/>
+        </p:spPr>
+        <p:txBody>
+          <a:bodyPr vert="horz" wrap="square" lIns="91440" tIns="45720" rIns="91440" bIns="45720" numCol="1" rtlCol="0" anchor="t" anchorCtr="0" compatLnSpc="1">
+            <a:prstTxWarp prst="textNoShape">
+              <a:avLst/>
+            </a:prstTxWarp>
+            <a:spAutoFit/>
+          </a:bodyPr>
+          <a:lstStyle/>
+          <a:p>
+            <a:pPr marL="0" marR="0" indent="0" algn="l" defTabSz="914400" rtl="0" eaLnBrk="1" fontAlgn="base" latinLnBrk="0" hangingPunct="1">
+              <a:lnSpc>
+                <a:spcPct val="100000"/>
+              </a:lnSpc>
+              <a:spcBef>
+                <a:spcPct val="50000"/>
+              </a:spcBef>
+              <a:spcAft>
+                <a:spcPct val="0"/>
+              </a:spcAft>
+              <a:buClrTx/>
+              <a:buSzTx/>
+              <a:buFontTx/>
+              <a:buNone/>
+              <a:tabLst/>
+            </a:pPr>
+            <a:endParaRPr kumimoji="0" lang="en-US" sz="2400" b="0" i="0" u="none" strike="noStrike" cap="none" normalizeH="0" baseline="0" smtClean="0">
+              <a:ln>
+                <a:noFill/>
+              </a:ln>
+              <a:solidFill>
+                <a:schemeClr val="tx1"/>
+              </a:solidFill>
+              <a:effectLst/>
+              <a:latin typeface="Times New Roman" pitchFamily="18" charset="0"/>
+              <a:sym typeface="Wingdings" pitchFamily="2" charset="2"/>
+            </a:endParaRPr>
+          </a:p>
+        </p:txBody>
+      </p:sp>
+      <p:sp>
+        <p:nvSpPr>
+          <p:cNvPr id="5" name="Rectangle 4"/>
+          <p:cNvSpPr/>
+          <p:nvPr/>
+        </p:nvSpPr>
+        <p:spPr bwMode="auto">
+          <a:xfrm>
+            <a:off x="1320799" y="2743200"/>
+            <a:ext cx="3903134" cy="296333"/>
+          </a:xfrm>
+          <a:prstGeom prst="rect">
+            <a:avLst/>
+          </a:prstGeom>
+          <a:noFill/>
+          <a:ln w="19050" cap="flat" cmpd="sng" algn="ctr">
+            <a:solidFill>
+              <a:srgbClr val="FFC000"/>
+            </a:solidFill>
+            <a:prstDash val="solid"/>
+            <a:round/>
+            <a:headEnd type="none" w="med" len="med"/>
+            <a:tailEnd type="none" w="med" len="med"/>
+          </a:ln>
+          <a:effectLst/>
+        </p:spPr>
+        <p:txBody>
+          <a:bodyPr vert="horz" wrap="square" lIns="91440" tIns="45720" rIns="91440" bIns="45720" numCol="1" rtlCol="0" anchor="t" anchorCtr="0" compatLnSpc="1">
+            <a:prstTxWarp prst="textNoShape">
+              <a:avLst/>
+            </a:prstTxWarp>
+            <a:spAutoFit/>
+          </a:bodyPr>
+          <a:lstStyle/>
+          <a:p>
+            <a:pPr marL="0" marR="0" indent="0" algn="l" defTabSz="914400" rtl="0" eaLnBrk="1" fontAlgn="base" latinLnBrk="0" hangingPunct="1">
+              <a:lnSpc>
+                <a:spcPct val="100000"/>
+              </a:lnSpc>
+              <a:spcBef>
+                <a:spcPct val="50000"/>
+              </a:spcBef>
+              <a:spcAft>
+                <a:spcPct val="0"/>
+              </a:spcAft>
+              <a:buClrTx/>
+              <a:buSzTx/>
+              <a:buFontTx/>
+              <a:buNone/>
+              <a:tabLst/>
+            </a:pPr>
+            <a:endParaRPr kumimoji="0" lang="en-US" sz="2400" b="0" i="0" u="none" strike="noStrike" cap="none" normalizeH="0" baseline="0" smtClean="0">
+              <a:ln>
+                <a:noFill/>
+              </a:ln>
+              <a:solidFill>
+                <a:schemeClr val="tx1"/>
+              </a:solidFill>
+              <a:effectLst/>
+              <a:latin typeface="Times New Roman" pitchFamily="18" charset="0"/>
+              <a:sym typeface="Wingdings" pitchFamily="2" charset="2"/>
+            </a:endParaRPr>
+          </a:p>
+        </p:txBody>
+      </p:sp>
+      <p:sp>
+        <p:nvSpPr>
+          <p:cNvPr id="6" name="Rectangle 5"/>
+          <p:cNvSpPr/>
+          <p:nvPr/>
+        </p:nvSpPr>
+        <p:spPr bwMode="auto">
+          <a:xfrm>
+            <a:off x="1320799" y="1998133"/>
+            <a:ext cx="3242733" cy="296333"/>
+          </a:xfrm>
+          <a:prstGeom prst="rect">
+            <a:avLst/>
+          </a:prstGeom>
+          <a:noFill/>
+          <a:ln w="19050" cap="flat" cmpd="sng" algn="ctr">
+            <a:solidFill>
+              <a:schemeClr val="accent2"/>
+            </a:solidFill>
+            <a:prstDash val="solid"/>
+            <a:round/>
+            <a:headEnd type="none" w="med" len="med"/>
+            <a:tailEnd type="none" w="med" len="med"/>
+          </a:ln>
+          <a:effectLst/>
+        </p:spPr>
+        <p:txBody>
+          <a:bodyPr vert="horz" wrap="square" lIns="91440" tIns="45720" rIns="91440" bIns="45720" numCol="1" rtlCol="0" anchor="t" anchorCtr="0" compatLnSpc="1">
+            <a:prstTxWarp prst="textNoShape">
+              <a:avLst/>
+            </a:prstTxWarp>
+            <a:spAutoFit/>
+          </a:bodyPr>
+          <a:lstStyle/>
+          <a:p>
+            <a:pPr marL="0" marR="0" indent="0" algn="l" defTabSz="914400" rtl="0" eaLnBrk="1" fontAlgn="base" latinLnBrk="0" hangingPunct="1">
+              <a:lnSpc>
+                <a:spcPct val="100000"/>
+              </a:lnSpc>
+              <a:spcBef>
+                <a:spcPct val="50000"/>
+              </a:spcBef>
+              <a:spcAft>
+                <a:spcPct val="0"/>
+              </a:spcAft>
+              <a:buClrTx/>
+              <a:buSzTx/>
+              <a:buFontTx/>
+              <a:buNone/>
+              <a:tabLst/>
+            </a:pPr>
+            <a:endParaRPr kumimoji="0" lang="en-US" sz="2400" b="0" i="0" u="none" strike="noStrike" cap="none" normalizeH="0" baseline="0" smtClean="0">
+              <a:ln>
+                <a:noFill/>
+              </a:ln>
+              <a:solidFill>
+                <a:schemeClr val="tx1"/>
+              </a:solidFill>
+              <a:effectLst/>
+              <a:latin typeface="Times New Roman" pitchFamily="18" charset="0"/>
+              <a:sym typeface="Wingdings" pitchFamily="2" charset="2"/>
+            </a:endParaRPr>
+          </a:p>
+        </p:txBody>
+      </p:sp>
+      <p:sp>
+        <p:nvSpPr>
+          <p:cNvPr id="7" name="Rectangle 6"/>
+          <p:cNvSpPr/>
+          <p:nvPr/>
+        </p:nvSpPr>
+        <p:spPr bwMode="auto">
+          <a:xfrm>
+            <a:off x="1320800" y="1016000"/>
+            <a:ext cx="4131733" cy="296333"/>
+          </a:xfrm>
+          <a:prstGeom prst="rect">
+            <a:avLst/>
+          </a:prstGeom>
+          <a:noFill/>
+          <a:ln w="19050" cap="flat" cmpd="sng" algn="ctr">
+            <a:solidFill>
+              <a:srgbClr val="7030A0"/>
+            </a:solidFill>
+            <a:prstDash val="solid"/>
+            <a:round/>
+            <a:headEnd type="none" w="med" len="med"/>
+            <a:tailEnd type="none" w="med" len="med"/>
+          </a:ln>
+          <a:effectLst/>
+        </p:spPr>
+        <p:txBody>
+          <a:bodyPr vert="horz" wrap="square" lIns="91440" tIns="45720" rIns="91440" bIns="45720" numCol="1" rtlCol="0" anchor="t" anchorCtr="0" compatLnSpc="1">
+            <a:prstTxWarp prst="textNoShape">
+              <a:avLst/>
+            </a:prstTxWarp>
+            <a:spAutoFit/>
+          </a:bodyPr>
+          <a:lstStyle/>
+          <a:p>
+            <a:pPr marL="0" marR="0" indent="0" algn="l" defTabSz="914400" rtl="0" eaLnBrk="1" fontAlgn="base" latinLnBrk="0" hangingPunct="1">
+              <a:lnSpc>
+                <a:spcPct val="100000"/>
+              </a:lnSpc>
+              <a:spcBef>
+                <a:spcPct val="50000"/>
+              </a:spcBef>
+              <a:spcAft>
+                <a:spcPct val="0"/>
+              </a:spcAft>
+              <a:buClrTx/>
+              <a:buSzTx/>
+              <a:buFontTx/>
+              <a:buNone/>
+              <a:tabLst/>
+            </a:pPr>
+            <a:endParaRPr kumimoji="0" lang="en-US" sz="2400" b="0" i="0" u="none" strike="noStrike" cap="none" normalizeH="0" baseline="0" smtClean="0">
+              <a:ln>
+                <a:noFill/>
+              </a:ln>
+              <a:solidFill>
+                <a:schemeClr val="tx1"/>
+              </a:solidFill>
+              <a:effectLst/>
+              <a:latin typeface="Times New Roman" pitchFamily="18" charset="0"/>
+              <a:sym typeface="Wingdings" pitchFamily="2" charset="2"/>
+            </a:endParaRPr>
+          </a:p>
+        </p:txBody>
+      </p:sp>
+      <p:sp>
+        <p:nvSpPr>
+          <p:cNvPr id="8" name="TextBox 7"/>
+          <p:cNvSpPr txBox="1"/>
+          <p:nvPr/>
+        </p:nvSpPr>
+        <p:spPr>
+          <a:xfrm>
+            <a:off x="990600" y="1977022"/>
+            <a:ext cx="321733" cy="338554"/>
+          </a:xfrm>
+          <a:prstGeom prst="rect">
+            <a:avLst/>
+          </a:prstGeom>
+          <a:noFill/>
+        </p:spPr>
+        <p:txBody>
+          <a:bodyPr wrap="square" rtlCol="0">
+            <a:spAutoFit/>
+          </a:bodyPr>
+          <a:lstStyle/>
+          <a:p>
+            <a:r>
+              <a:rPr lang="en-US" sz="1600" dirty="0" smtClean="0">
+                <a:solidFill>
+                  <a:schemeClr val="accent2"/>
+                </a:solidFill>
+              </a:rPr>
+              <a:t>1</a:t>
+            </a:r>
+            <a:endParaRPr lang="en-US" sz="1600" dirty="0">
+              <a:solidFill>
+                <a:schemeClr val="accent2"/>
+              </a:solidFill>
+            </a:endParaRPr>
+          </a:p>
+        </p:txBody>
+      </p:sp>
+      <p:sp>
+        <p:nvSpPr>
+          <p:cNvPr id="9" name="TextBox 8"/>
+          <p:cNvSpPr txBox="1"/>
+          <p:nvPr/>
+        </p:nvSpPr>
+        <p:spPr>
+          <a:xfrm>
+            <a:off x="990600" y="3039533"/>
+            <a:ext cx="321733" cy="338554"/>
+          </a:xfrm>
+          <a:prstGeom prst="rect">
+            <a:avLst/>
+          </a:prstGeom>
+          <a:noFill/>
+        </p:spPr>
+        <p:txBody>
+          <a:bodyPr wrap="square" rtlCol="0">
+            <a:spAutoFit/>
+          </a:bodyPr>
+          <a:lstStyle/>
+          <a:p>
+            <a:r>
+              <a:rPr lang="en-US" sz="1600" dirty="0">
+                <a:solidFill>
+                  <a:srgbClr val="FF0000"/>
+                </a:solidFill>
+              </a:rPr>
+              <a:t>2</a:t>
+            </a:r>
+          </a:p>
+        </p:txBody>
+      </p:sp>
+      <p:sp>
+        <p:nvSpPr>
+          <p:cNvPr id="10" name="TextBox 9"/>
+          <p:cNvSpPr txBox="1"/>
+          <p:nvPr/>
+        </p:nvSpPr>
+        <p:spPr>
+          <a:xfrm>
+            <a:off x="990598" y="994889"/>
+            <a:ext cx="321733" cy="338554"/>
+          </a:xfrm>
+          <a:prstGeom prst="rect">
+            <a:avLst/>
+          </a:prstGeom>
+          <a:noFill/>
+        </p:spPr>
+        <p:txBody>
+          <a:bodyPr wrap="square" rtlCol="0">
+            <a:spAutoFit/>
+          </a:bodyPr>
+          <a:lstStyle/>
+          <a:p>
+            <a:r>
+              <a:rPr lang="en-US" sz="1600" dirty="0">
+                <a:solidFill>
+                  <a:srgbClr val="7030A0"/>
+                </a:solidFill>
+              </a:rPr>
+              <a:t>4</a:t>
+            </a:r>
+          </a:p>
+        </p:txBody>
+      </p:sp>
+      <p:sp>
+        <p:nvSpPr>
+          <p:cNvPr id="11" name="TextBox 10"/>
+          <p:cNvSpPr txBox="1"/>
+          <p:nvPr/>
+        </p:nvSpPr>
+        <p:spPr>
+          <a:xfrm>
+            <a:off x="990599" y="2722089"/>
+            <a:ext cx="321733" cy="338554"/>
+          </a:xfrm>
+          <a:prstGeom prst="rect">
+            <a:avLst/>
+          </a:prstGeom>
+          <a:noFill/>
+        </p:spPr>
+        <p:txBody>
+          <a:bodyPr wrap="square" rtlCol="0">
+            <a:spAutoFit/>
+          </a:bodyPr>
+          <a:lstStyle/>
+          <a:p>
+            <a:r>
+              <a:rPr lang="en-US" sz="1600" dirty="0" smtClean="0">
+                <a:solidFill>
+                  <a:srgbClr val="FFC000"/>
+                </a:solidFill>
+              </a:rPr>
+              <a:t>3</a:t>
+            </a:r>
+            <a:endParaRPr lang="en-US" sz="1600" dirty="0">
+              <a:solidFill>
+                <a:srgbClr val="FFC000"/>
+              </a:solidFill>
+            </a:endParaRPr>
+          </a:p>
+        </p:txBody>
+      </p:sp>
     </p:spTree>
     <p:extLst>
       <p:ext uri="{BB962C8B-B14F-4D97-AF65-F5344CB8AC3E}">
@@ -11030,9 +12020,698 @@
   <p:timing>
     <p:tnLst>
       <p:par>
-        <p:cTn id="1" dur="indefinite" restart="never" nodeType="tmRoot"/>
+        <p:cTn id="1" dur="indefinite" restart="never" nodeType="tmRoot">
+          <p:childTnLst>
+            <p:seq concurrent="1" nextAc="seek">
+              <p:cTn id="2" dur="indefinite" nodeType="mainSeq">
+                <p:childTnLst>
+                  <p:par>
+                    <p:cTn id="3" fill="hold">
+                      <p:stCondLst>
+                        <p:cond delay="indefinite"/>
+                      </p:stCondLst>
+                      <p:childTnLst>
+                        <p:par>
+                          <p:cTn id="4" fill="hold">
+                            <p:stCondLst>
+                              <p:cond delay="0"/>
+                            </p:stCondLst>
+                            <p:childTnLst>
+                              <p:par>
+                                <p:cTn id="5" presetID="2" presetClass="entr" presetSubtype="4" fill="hold" grpId="0" nodeType="clickEffect">
+                                  <p:stCondLst>
+                                    <p:cond delay="0"/>
+                                  </p:stCondLst>
+                                  <p:childTnLst>
+                                    <p:set>
+                                      <p:cBhvr>
+                                        <p:cTn id="6" dur="1" fill="hold">
+                                          <p:stCondLst>
+                                            <p:cond delay="0"/>
+                                          </p:stCondLst>
+                                        </p:cTn>
+                                        <p:tgtEl>
+                                          <p:spTgt spid="6"/>
+                                        </p:tgtEl>
+                                        <p:attrNameLst>
+                                          <p:attrName>style.visibility</p:attrName>
+                                        </p:attrNameLst>
+                                      </p:cBhvr>
+                                      <p:to>
+                                        <p:strVal val="visible"/>
+                                      </p:to>
+                                    </p:set>
+                                    <p:anim calcmode="lin" valueType="num">
+                                      <p:cBhvr additive="base">
+                                        <p:cTn id="7" dur="500" fill="hold"/>
+                                        <p:tgtEl>
+                                          <p:spTgt spid="6"/>
+                                        </p:tgtEl>
+                                        <p:attrNameLst>
+                                          <p:attrName>ppt_x</p:attrName>
+                                        </p:attrNameLst>
+                                      </p:cBhvr>
+                                      <p:tavLst>
+                                        <p:tav tm="0">
+                                          <p:val>
+                                            <p:strVal val="#ppt_x"/>
+                                          </p:val>
+                                        </p:tav>
+                                        <p:tav tm="100000">
+                                          <p:val>
+                                            <p:strVal val="#ppt_x"/>
+                                          </p:val>
+                                        </p:tav>
+                                      </p:tavLst>
+                                    </p:anim>
+                                    <p:anim calcmode="lin" valueType="num">
+                                      <p:cBhvr additive="base">
+                                        <p:cTn id="8" dur="500" fill="hold"/>
+                                        <p:tgtEl>
+                                          <p:spTgt spid="6"/>
+                                        </p:tgtEl>
+                                        <p:attrNameLst>
+                                          <p:attrName>ppt_y</p:attrName>
+                                        </p:attrNameLst>
+                                      </p:cBhvr>
+                                      <p:tavLst>
+                                        <p:tav tm="0">
+                                          <p:val>
+                                            <p:strVal val="1+#ppt_h/2"/>
+                                          </p:val>
+                                        </p:tav>
+                                        <p:tav tm="100000">
+                                          <p:val>
+                                            <p:strVal val="#ppt_y"/>
+                                          </p:val>
+                                        </p:tav>
+                                      </p:tavLst>
+                                    </p:anim>
+                                  </p:childTnLst>
+                                </p:cTn>
+                              </p:par>
+                              <p:par>
+                                <p:cTn id="9" presetID="2" presetClass="entr" presetSubtype="4" fill="hold" grpId="0" nodeType="withEffect">
+                                  <p:stCondLst>
+                                    <p:cond delay="0"/>
+                                  </p:stCondLst>
+                                  <p:childTnLst>
+                                    <p:set>
+                                      <p:cBhvr>
+                                        <p:cTn id="10" dur="1" fill="hold">
+                                          <p:stCondLst>
+                                            <p:cond delay="0"/>
+                                          </p:stCondLst>
+                                        </p:cTn>
+                                        <p:tgtEl>
+                                          <p:spTgt spid="8"/>
+                                        </p:tgtEl>
+                                        <p:attrNameLst>
+                                          <p:attrName>style.visibility</p:attrName>
+                                        </p:attrNameLst>
+                                      </p:cBhvr>
+                                      <p:to>
+                                        <p:strVal val="visible"/>
+                                      </p:to>
+                                    </p:set>
+                                    <p:anim calcmode="lin" valueType="num">
+                                      <p:cBhvr additive="base">
+                                        <p:cTn id="11" dur="500" fill="hold"/>
+                                        <p:tgtEl>
+                                          <p:spTgt spid="8"/>
+                                        </p:tgtEl>
+                                        <p:attrNameLst>
+                                          <p:attrName>ppt_x</p:attrName>
+                                        </p:attrNameLst>
+                                      </p:cBhvr>
+                                      <p:tavLst>
+                                        <p:tav tm="0">
+                                          <p:val>
+                                            <p:strVal val="#ppt_x"/>
+                                          </p:val>
+                                        </p:tav>
+                                        <p:tav tm="100000">
+                                          <p:val>
+                                            <p:strVal val="#ppt_x"/>
+                                          </p:val>
+                                        </p:tav>
+                                      </p:tavLst>
+                                    </p:anim>
+                                    <p:anim calcmode="lin" valueType="num">
+                                      <p:cBhvr additive="base">
+                                        <p:cTn id="12" dur="500" fill="hold"/>
+                                        <p:tgtEl>
+                                          <p:spTgt spid="8"/>
+                                        </p:tgtEl>
+                                        <p:attrNameLst>
+                                          <p:attrName>ppt_y</p:attrName>
+                                        </p:attrNameLst>
+                                      </p:cBhvr>
+                                      <p:tavLst>
+                                        <p:tav tm="0">
+                                          <p:val>
+                                            <p:strVal val="1+#ppt_h/2"/>
+                                          </p:val>
+                                        </p:tav>
+                                        <p:tav tm="100000">
+                                          <p:val>
+                                            <p:strVal val="#ppt_y"/>
+                                          </p:val>
+                                        </p:tav>
+                                      </p:tavLst>
+                                    </p:anim>
+                                  </p:childTnLst>
+                                </p:cTn>
+                              </p:par>
+                            </p:childTnLst>
+                          </p:cTn>
+                        </p:par>
+                      </p:childTnLst>
+                    </p:cTn>
+                  </p:par>
+                  <p:par>
+                    <p:cTn id="13" fill="hold">
+                      <p:stCondLst>
+                        <p:cond delay="indefinite"/>
+                      </p:stCondLst>
+                      <p:childTnLst>
+                        <p:par>
+                          <p:cTn id="14" fill="hold">
+                            <p:stCondLst>
+                              <p:cond delay="0"/>
+                            </p:stCondLst>
+                            <p:childTnLst>
+                              <p:par>
+                                <p:cTn id="15" presetID="2" presetClass="entr" presetSubtype="4" fill="hold" grpId="0" nodeType="clickEffect">
+                                  <p:stCondLst>
+                                    <p:cond delay="0"/>
+                                  </p:stCondLst>
+                                  <p:childTnLst>
+                                    <p:set>
+                                      <p:cBhvr>
+                                        <p:cTn id="16" dur="1" fill="hold">
+                                          <p:stCondLst>
+                                            <p:cond delay="0"/>
+                                          </p:stCondLst>
+                                        </p:cTn>
+                                        <p:tgtEl>
+                                          <p:spTgt spid="3"/>
+                                        </p:tgtEl>
+                                        <p:attrNameLst>
+                                          <p:attrName>style.visibility</p:attrName>
+                                        </p:attrNameLst>
+                                      </p:cBhvr>
+                                      <p:to>
+                                        <p:strVal val="visible"/>
+                                      </p:to>
+                                    </p:set>
+                                    <p:anim calcmode="lin" valueType="num">
+                                      <p:cBhvr additive="base">
+                                        <p:cTn id="17" dur="500" fill="hold"/>
+                                        <p:tgtEl>
+                                          <p:spTgt spid="3"/>
+                                        </p:tgtEl>
+                                        <p:attrNameLst>
+                                          <p:attrName>ppt_x</p:attrName>
+                                        </p:attrNameLst>
+                                      </p:cBhvr>
+                                      <p:tavLst>
+                                        <p:tav tm="0">
+                                          <p:val>
+                                            <p:strVal val="#ppt_x"/>
+                                          </p:val>
+                                        </p:tav>
+                                        <p:tav tm="100000">
+                                          <p:val>
+                                            <p:strVal val="#ppt_x"/>
+                                          </p:val>
+                                        </p:tav>
+                                      </p:tavLst>
+                                    </p:anim>
+                                    <p:anim calcmode="lin" valueType="num">
+                                      <p:cBhvr additive="base">
+                                        <p:cTn id="18" dur="500" fill="hold"/>
+                                        <p:tgtEl>
+                                          <p:spTgt spid="3"/>
+                                        </p:tgtEl>
+                                        <p:attrNameLst>
+                                          <p:attrName>ppt_y</p:attrName>
+                                        </p:attrNameLst>
+                                      </p:cBhvr>
+                                      <p:tavLst>
+                                        <p:tav tm="0">
+                                          <p:val>
+                                            <p:strVal val="1+#ppt_h/2"/>
+                                          </p:val>
+                                        </p:tav>
+                                        <p:tav tm="100000">
+                                          <p:val>
+                                            <p:strVal val="#ppt_y"/>
+                                          </p:val>
+                                        </p:tav>
+                                      </p:tavLst>
+                                    </p:anim>
+                                  </p:childTnLst>
+                                </p:cTn>
+                              </p:par>
+                              <p:par>
+                                <p:cTn id="19" presetID="2" presetClass="entr" presetSubtype="4" fill="hold" grpId="0" nodeType="withEffect">
+                                  <p:stCondLst>
+                                    <p:cond delay="0"/>
+                                  </p:stCondLst>
+                                  <p:childTnLst>
+                                    <p:set>
+                                      <p:cBhvr>
+                                        <p:cTn id="20" dur="1" fill="hold">
+                                          <p:stCondLst>
+                                            <p:cond delay="0"/>
+                                          </p:stCondLst>
+                                        </p:cTn>
+                                        <p:tgtEl>
+                                          <p:spTgt spid="9"/>
+                                        </p:tgtEl>
+                                        <p:attrNameLst>
+                                          <p:attrName>style.visibility</p:attrName>
+                                        </p:attrNameLst>
+                                      </p:cBhvr>
+                                      <p:to>
+                                        <p:strVal val="visible"/>
+                                      </p:to>
+                                    </p:set>
+                                    <p:anim calcmode="lin" valueType="num">
+                                      <p:cBhvr additive="base">
+                                        <p:cTn id="21" dur="500" fill="hold"/>
+                                        <p:tgtEl>
+                                          <p:spTgt spid="9"/>
+                                        </p:tgtEl>
+                                        <p:attrNameLst>
+                                          <p:attrName>ppt_x</p:attrName>
+                                        </p:attrNameLst>
+                                      </p:cBhvr>
+                                      <p:tavLst>
+                                        <p:tav tm="0">
+                                          <p:val>
+                                            <p:strVal val="#ppt_x"/>
+                                          </p:val>
+                                        </p:tav>
+                                        <p:tav tm="100000">
+                                          <p:val>
+                                            <p:strVal val="#ppt_x"/>
+                                          </p:val>
+                                        </p:tav>
+                                      </p:tavLst>
+                                    </p:anim>
+                                    <p:anim calcmode="lin" valueType="num">
+                                      <p:cBhvr additive="base">
+                                        <p:cTn id="22" dur="500" fill="hold"/>
+                                        <p:tgtEl>
+                                          <p:spTgt spid="9"/>
+                                        </p:tgtEl>
+                                        <p:attrNameLst>
+                                          <p:attrName>ppt_y</p:attrName>
+                                        </p:attrNameLst>
+                                      </p:cBhvr>
+                                      <p:tavLst>
+                                        <p:tav tm="0">
+                                          <p:val>
+                                            <p:strVal val="1+#ppt_h/2"/>
+                                          </p:val>
+                                        </p:tav>
+                                        <p:tav tm="100000">
+                                          <p:val>
+                                            <p:strVal val="#ppt_y"/>
+                                          </p:val>
+                                        </p:tav>
+                                      </p:tavLst>
+                                    </p:anim>
+                                  </p:childTnLst>
+                                </p:cTn>
+                              </p:par>
+                            </p:childTnLst>
+                          </p:cTn>
+                        </p:par>
+                      </p:childTnLst>
+                    </p:cTn>
+                  </p:par>
+                  <p:par>
+                    <p:cTn id="23" fill="hold">
+                      <p:stCondLst>
+                        <p:cond delay="indefinite"/>
+                      </p:stCondLst>
+                      <p:childTnLst>
+                        <p:par>
+                          <p:cTn id="24" fill="hold">
+                            <p:stCondLst>
+                              <p:cond delay="0"/>
+                            </p:stCondLst>
+                            <p:childTnLst>
+                              <p:par>
+                                <p:cTn id="25" presetID="2" presetClass="entr" presetSubtype="4" fill="hold" grpId="0" nodeType="clickEffect">
+                                  <p:stCondLst>
+                                    <p:cond delay="0"/>
+                                  </p:stCondLst>
+                                  <p:childTnLst>
+                                    <p:set>
+                                      <p:cBhvr>
+                                        <p:cTn id="26" dur="1" fill="hold">
+                                          <p:stCondLst>
+                                            <p:cond delay="0"/>
+                                          </p:stCondLst>
+                                        </p:cTn>
+                                        <p:tgtEl>
+                                          <p:spTgt spid="5"/>
+                                        </p:tgtEl>
+                                        <p:attrNameLst>
+                                          <p:attrName>style.visibility</p:attrName>
+                                        </p:attrNameLst>
+                                      </p:cBhvr>
+                                      <p:to>
+                                        <p:strVal val="visible"/>
+                                      </p:to>
+                                    </p:set>
+                                    <p:anim calcmode="lin" valueType="num">
+                                      <p:cBhvr additive="base">
+                                        <p:cTn id="27" dur="500" fill="hold"/>
+                                        <p:tgtEl>
+                                          <p:spTgt spid="5"/>
+                                        </p:tgtEl>
+                                        <p:attrNameLst>
+                                          <p:attrName>ppt_x</p:attrName>
+                                        </p:attrNameLst>
+                                      </p:cBhvr>
+                                      <p:tavLst>
+                                        <p:tav tm="0">
+                                          <p:val>
+                                            <p:strVal val="#ppt_x"/>
+                                          </p:val>
+                                        </p:tav>
+                                        <p:tav tm="100000">
+                                          <p:val>
+                                            <p:strVal val="#ppt_x"/>
+                                          </p:val>
+                                        </p:tav>
+                                      </p:tavLst>
+                                    </p:anim>
+                                    <p:anim calcmode="lin" valueType="num">
+                                      <p:cBhvr additive="base">
+                                        <p:cTn id="28" dur="500" fill="hold"/>
+                                        <p:tgtEl>
+                                          <p:spTgt spid="5"/>
+                                        </p:tgtEl>
+                                        <p:attrNameLst>
+                                          <p:attrName>ppt_y</p:attrName>
+                                        </p:attrNameLst>
+                                      </p:cBhvr>
+                                      <p:tavLst>
+                                        <p:tav tm="0">
+                                          <p:val>
+                                            <p:strVal val="1+#ppt_h/2"/>
+                                          </p:val>
+                                        </p:tav>
+                                        <p:tav tm="100000">
+                                          <p:val>
+                                            <p:strVal val="#ppt_y"/>
+                                          </p:val>
+                                        </p:tav>
+                                      </p:tavLst>
+                                    </p:anim>
+                                  </p:childTnLst>
+                                </p:cTn>
+                              </p:par>
+                              <p:par>
+                                <p:cTn id="29" presetID="2" presetClass="entr" presetSubtype="4" fill="hold" grpId="0" nodeType="withEffect">
+                                  <p:stCondLst>
+                                    <p:cond delay="0"/>
+                                  </p:stCondLst>
+                                  <p:childTnLst>
+                                    <p:set>
+                                      <p:cBhvr>
+                                        <p:cTn id="30" dur="1" fill="hold">
+                                          <p:stCondLst>
+                                            <p:cond delay="0"/>
+                                          </p:stCondLst>
+                                        </p:cTn>
+                                        <p:tgtEl>
+                                          <p:spTgt spid="11"/>
+                                        </p:tgtEl>
+                                        <p:attrNameLst>
+                                          <p:attrName>style.visibility</p:attrName>
+                                        </p:attrNameLst>
+                                      </p:cBhvr>
+                                      <p:to>
+                                        <p:strVal val="visible"/>
+                                      </p:to>
+                                    </p:set>
+                                    <p:anim calcmode="lin" valueType="num">
+                                      <p:cBhvr additive="base">
+                                        <p:cTn id="31" dur="500" fill="hold"/>
+                                        <p:tgtEl>
+                                          <p:spTgt spid="11"/>
+                                        </p:tgtEl>
+                                        <p:attrNameLst>
+                                          <p:attrName>ppt_x</p:attrName>
+                                        </p:attrNameLst>
+                                      </p:cBhvr>
+                                      <p:tavLst>
+                                        <p:tav tm="0">
+                                          <p:val>
+                                            <p:strVal val="#ppt_x"/>
+                                          </p:val>
+                                        </p:tav>
+                                        <p:tav tm="100000">
+                                          <p:val>
+                                            <p:strVal val="#ppt_x"/>
+                                          </p:val>
+                                        </p:tav>
+                                      </p:tavLst>
+                                    </p:anim>
+                                    <p:anim calcmode="lin" valueType="num">
+                                      <p:cBhvr additive="base">
+                                        <p:cTn id="32" dur="500" fill="hold"/>
+                                        <p:tgtEl>
+                                          <p:spTgt spid="11"/>
+                                        </p:tgtEl>
+                                        <p:attrNameLst>
+                                          <p:attrName>ppt_y</p:attrName>
+                                        </p:attrNameLst>
+                                      </p:cBhvr>
+                                      <p:tavLst>
+                                        <p:tav tm="0">
+                                          <p:val>
+                                            <p:strVal val="1+#ppt_h/2"/>
+                                          </p:val>
+                                        </p:tav>
+                                        <p:tav tm="100000">
+                                          <p:val>
+                                            <p:strVal val="#ppt_y"/>
+                                          </p:val>
+                                        </p:tav>
+                                      </p:tavLst>
+                                    </p:anim>
+                                  </p:childTnLst>
+                                </p:cTn>
+                              </p:par>
+                            </p:childTnLst>
+                          </p:cTn>
+                        </p:par>
+                      </p:childTnLst>
+                    </p:cTn>
+                  </p:par>
+                  <p:par>
+                    <p:cTn id="33" fill="hold">
+                      <p:stCondLst>
+                        <p:cond delay="indefinite"/>
+                      </p:stCondLst>
+                      <p:childTnLst>
+                        <p:par>
+                          <p:cTn id="34" fill="hold">
+                            <p:stCondLst>
+                              <p:cond delay="0"/>
+                            </p:stCondLst>
+                            <p:childTnLst>
+                              <p:par>
+                                <p:cTn id="35" presetID="2" presetClass="entr" presetSubtype="4" fill="hold" grpId="0" nodeType="clickEffect">
+                                  <p:stCondLst>
+                                    <p:cond delay="0"/>
+                                  </p:stCondLst>
+                                  <p:childTnLst>
+                                    <p:set>
+                                      <p:cBhvr>
+                                        <p:cTn id="36" dur="1" fill="hold">
+                                          <p:stCondLst>
+                                            <p:cond delay="0"/>
+                                          </p:stCondLst>
+                                        </p:cTn>
+                                        <p:tgtEl>
+                                          <p:spTgt spid="7"/>
+                                        </p:tgtEl>
+                                        <p:attrNameLst>
+                                          <p:attrName>style.visibility</p:attrName>
+                                        </p:attrNameLst>
+                                      </p:cBhvr>
+                                      <p:to>
+                                        <p:strVal val="visible"/>
+                                      </p:to>
+                                    </p:set>
+                                    <p:anim calcmode="lin" valueType="num">
+                                      <p:cBhvr additive="base">
+                                        <p:cTn id="37" dur="500" fill="hold"/>
+                                        <p:tgtEl>
+                                          <p:spTgt spid="7"/>
+                                        </p:tgtEl>
+                                        <p:attrNameLst>
+                                          <p:attrName>ppt_x</p:attrName>
+                                        </p:attrNameLst>
+                                      </p:cBhvr>
+                                      <p:tavLst>
+                                        <p:tav tm="0">
+                                          <p:val>
+                                            <p:strVal val="#ppt_x"/>
+                                          </p:val>
+                                        </p:tav>
+                                        <p:tav tm="100000">
+                                          <p:val>
+                                            <p:strVal val="#ppt_x"/>
+                                          </p:val>
+                                        </p:tav>
+                                      </p:tavLst>
+                                    </p:anim>
+                                    <p:anim calcmode="lin" valueType="num">
+                                      <p:cBhvr additive="base">
+                                        <p:cTn id="38" dur="500" fill="hold"/>
+                                        <p:tgtEl>
+                                          <p:spTgt spid="7"/>
+                                        </p:tgtEl>
+                                        <p:attrNameLst>
+                                          <p:attrName>ppt_y</p:attrName>
+                                        </p:attrNameLst>
+                                      </p:cBhvr>
+                                      <p:tavLst>
+                                        <p:tav tm="0">
+                                          <p:val>
+                                            <p:strVal val="1+#ppt_h/2"/>
+                                          </p:val>
+                                        </p:tav>
+                                        <p:tav tm="100000">
+                                          <p:val>
+                                            <p:strVal val="#ppt_y"/>
+                                          </p:val>
+                                        </p:tav>
+                                      </p:tavLst>
+                                    </p:anim>
+                                  </p:childTnLst>
+                                </p:cTn>
+                              </p:par>
+                              <p:par>
+                                <p:cTn id="39" presetID="2" presetClass="entr" presetSubtype="4" fill="hold" grpId="0" nodeType="withEffect">
+                                  <p:stCondLst>
+                                    <p:cond delay="0"/>
+                                  </p:stCondLst>
+                                  <p:childTnLst>
+                                    <p:set>
+                                      <p:cBhvr>
+                                        <p:cTn id="40" dur="1" fill="hold">
+                                          <p:stCondLst>
+                                            <p:cond delay="0"/>
+                                          </p:stCondLst>
+                                        </p:cTn>
+                                        <p:tgtEl>
+                                          <p:spTgt spid="10"/>
+                                        </p:tgtEl>
+                                        <p:attrNameLst>
+                                          <p:attrName>style.visibility</p:attrName>
+                                        </p:attrNameLst>
+                                      </p:cBhvr>
+                                      <p:to>
+                                        <p:strVal val="visible"/>
+                                      </p:to>
+                                    </p:set>
+                                    <p:anim calcmode="lin" valueType="num">
+                                      <p:cBhvr additive="base">
+                                        <p:cTn id="41" dur="500" fill="hold"/>
+                                        <p:tgtEl>
+                                          <p:spTgt spid="10"/>
+                                        </p:tgtEl>
+                                        <p:attrNameLst>
+                                          <p:attrName>ppt_x</p:attrName>
+                                        </p:attrNameLst>
+                                      </p:cBhvr>
+                                      <p:tavLst>
+                                        <p:tav tm="0">
+                                          <p:val>
+                                            <p:strVal val="#ppt_x"/>
+                                          </p:val>
+                                        </p:tav>
+                                        <p:tav tm="100000">
+                                          <p:val>
+                                            <p:strVal val="#ppt_x"/>
+                                          </p:val>
+                                        </p:tav>
+                                      </p:tavLst>
+                                    </p:anim>
+                                    <p:anim calcmode="lin" valueType="num">
+                                      <p:cBhvr additive="base">
+                                        <p:cTn id="42" dur="500" fill="hold"/>
+                                        <p:tgtEl>
+                                          <p:spTgt spid="10"/>
+                                        </p:tgtEl>
+                                        <p:attrNameLst>
+                                          <p:attrName>ppt_y</p:attrName>
+                                        </p:attrNameLst>
+                                      </p:cBhvr>
+                                      <p:tavLst>
+                                        <p:tav tm="0">
+                                          <p:val>
+                                            <p:strVal val="1+#ppt_h/2"/>
+                                          </p:val>
+                                        </p:tav>
+                                        <p:tav tm="100000">
+                                          <p:val>
+                                            <p:strVal val="#ppt_y"/>
+                                          </p:val>
+                                        </p:tav>
+                                      </p:tavLst>
+                                    </p:anim>
+                                  </p:childTnLst>
+                                </p:cTn>
+                              </p:par>
+                            </p:childTnLst>
+                          </p:cTn>
+                        </p:par>
+                      </p:childTnLst>
+                    </p:cTn>
+                  </p:par>
+                </p:childTnLst>
+              </p:cTn>
+              <p:prevCondLst>
+                <p:cond evt="onPrev" delay="0">
+                  <p:tgtEl>
+                    <p:sldTgt/>
+                  </p:tgtEl>
+                </p:cond>
+              </p:prevCondLst>
+              <p:nextCondLst>
+                <p:cond evt="onNext" delay="0">
+                  <p:tgtEl>
+                    <p:sldTgt/>
+                  </p:tgtEl>
+                </p:cond>
+              </p:nextCondLst>
+            </p:seq>
+          </p:childTnLst>
+        </p:cTn>
       </p:par>
     </p:tnLst>
+    <p:bldLst>
+      <p:bldP spid="3" grpId="0" animBg="1"/>
+      <p:bldP spid="5" grpId="0" animBg="1"/>
+      <p:bldP spid="6" grpId="0" animBg="1"/>
+      <p:bldP spid="7" grpId="0" animBg="1"/>
+      <p:bldP spid="8" grpId="0"/>
+      <p:bldP spid="9" grpId="0"/>
+      <p:bldP spid="10" grpId="0"/>
+      <p:bldP spid="11" grpId="0"/>
+    </p:bldLst>
   </p:timing>
 </p:sld>
 </file>
@@ -16539,10 +18218,10 @@
         </p:nvGrpSpPr>
         <p:grpSpPr>
           <a:xfrm>
-            <a:off x="1842052" y="1683026"/>
-            <a:ext cx="6334539" cy="2597426"/>
-            <a:chOff x="1842052" y="1683026"/>
-            <a:chExt cx="6334539" cy="2597426"/>
+            <a:off x="2328333" y="1683026"/>
+            <a:ext cx="5848258" cy="2597426"/>
+            <a:chOff x="2328333" y="1683026"/>
+            <a:chExt cx="5848258" cy="2597426"/>
           </a:xfrm>
         </p:grpSpPr>
         <p:sp>
@@ -16649,8 +18328,8 @@
           </p:nvCxnSpPr>
           <p:spPr bwMode="auto">
             <a:xfrm flipH="1" flipV="1">
-              <a:off x="1842052" y="1683026"/>
-              <a:ext cx="5817705" cy="570923"/>
+              <a:off x="2328333" y="1683026"/>
+              <a:ext cx="5331424" cy="570923"/>
             </a:xfrm>
             <a:prstGeom prst="straightConnector1">
               <a:avLst/>
@@ -16677,10 +18356,10 @@
         </p:nvGrpSpPr>
         <p:grpSpPr>
           <a:xfrm>
-            <a:off x="1842052" y="914400"/>
-            <a:ext cx="6202018" cy="3366052"/>
-            <a:chOff x="1842052" y="914400"/>
-            <a:chExt cx="6202018" cy="3366052"/>
+            <a:off x="2328333" y="683567"/>
+            <a:ext cx="5424189" cy="3596885"/>
+            <a:chOff x="2328333" y="683567"/>
+            <a:chExt cx="5424189" cy="3596885"/>
           </a:xfrm>
         </p:grpSpPr>
         <p:sp>
@@ -16691,8 +18370,8 @@
           </p:nvSpPr>
           <p:spPr>
             <a:xfrm>
-              <a:off x="5804452" y="914400"/>
-              <a:ext cx="2239618" cy="461665"/>
+              <a:off x="5512904" y="683567"/>
+              <a:ext cx="2239618" cy="784830"/>
             </a:xfrm>
             <a:prstGeom prst="rect">
               <a:avLst/>
@@ -16721,7 +18400,41 @@
                 </a:rPr>
                 <a:t>egister mode</a:t>
               </a:r>
-              <a:endParaRPr lang="en-US" dirty="0">
+            </a:p>
+            <a:p>
+              <a:r>
+                <a:rPr lang="en-US" sz="1400" dirty="0">
+                  <a:solidFill>
+                    <a:srgbClr val="0070C0"/>
+                  </a:solidFill>
+                </a:rPr>
+                <a:t>Table 3-3 Blue Book </a:t>
+              </a:r>
+              <a:r>
+                <a:rPr lang="en-US" sz="1400" dirty="0" err="1">
+                  <a:solidFill>
+                    <a:srgbClr val="0070C0"/>
+                  </a:solidFill>
+                </a:rPr>
+                <a:t>Pg</a:t>
+              </a:r>
+              <a:r>
+                <a:rPr lang="en-US" sz="1400" dirty="0">
+                  <a:solidFill>
+                    <a:srgbClr val="0070C0"/>
+                  </a:solidFill>
+                </a:rPr>
+                <a:t> </a:t>
+              </a:r>
+              <a:r>
+                <a:rPr lang="en-US" sz="1400" dirty="0" smtClean="0">
+                  <a:solidFill>
+                    <a:srgbClr val="0070C0"/>
+                  </a:solidFill>
+                </a:rPr>
+                <a:t>12</a:t>
+              </a:r>
+              <a:endParaRPr lang="en-US" sz="1400" dirty="0">
                 <a:solidFill>
                   <a:srgbClr val="0070C0"/>
                 </a:solidFill>
@@ -16858,8 +18571,8 @@
           </p:nvCxnSpPr>
           <p:spPr bwMode="auto">
             <a:xfrm flipH="1">
-              <a:off x="1842052" y="1145232"/>
-              <a:ext cx="3856383" cy="352264"/>
+              <a:off x="2328333" y="1145232"/>
+              <a:ext cx="3370103" cy="352264"/>
             </a:xfrm>
             <a:prstGeom prst="straightConnector1">
               <a:avLst/>
@@ -27568,9 +29281,9 @@
         <p:grpSpPr>
           <a:xfrm>
             <a:off x="3742267" y="1044760"/>
-            <a:ext cx="4474081" cy="4918718"/>
+            <a:ext cx="4782607" cy="4918718"/>
             <a:chOff x="3742267" y="1044760"/>
-            <a:chExt cx="4474081" cy="4918718"/>
+            <a:chExt cx="4782607" cy="4918718"/>
           </a:xfrm>
         </p:grpSpPr>
         <p:sp>
@@ -27581,8 +29294,8 @@
           </p:nvSpPr>
           <p:spPr>
             <a:xfrm>
-              <a:off x="5976730" y="1044760"/>
-              <a:ext cx="2239618" cy="461665"/>
+              <a:off x="5976729" y="1044760"/>
+              <a:ext cx="2548145" cy="707886"/>
             </a:xfrm>
             <a:prstGeom prst="rect">
               <a:avLst/>
@@ -27596,14 +29309,24 @@
             <a:lstStyle/>
             <a:p>
               <a:r>
-                <a:rPr lang="en-US" dirty="0" smtClean="0">
+                <a:rPr lang="en-US" sz="1600" dirty="0" smtClean="0">
                   <a:solidFill>
                     <a:srgbClr val="0070C0"/>
                   </a:solidFill>
                 </a:rPr>
-                <a:t>Register mode</a:t>
+                <a:t>Register mode = Immediate</a:t>
               </a:r>
-              <a:endParaRPr lang="en-US" dirty="0">
+            </a:p>
+            <a:p>
+              <a:r>
+                <a:rPr lang="en-US" sz="1600" dirty="0" smtClean="0">
+                  <a:solidFill>
+                    <a:srgbClr val="0070C0"/>
+                  </a:solidFill>
+                </a:rPr>
+                <a:t>	    As/Ad 11/-</a:t>
+              </a:r>
+              <a:endParaRPr lang="en-US" sz="1600" dirty="0">
                 <a:solidFill>
                   <a:srgbClr val="0070C0"/>
                 </a:solidFill>
@@ -28032,58 +29755,62 @@
           </p:spPr>
         </p:cxnSp>
       </p:grpSp>
+      <p:sp>
+        <p:nvSpPr>
+          <p:cNvPr id="26" name="TextBox 25"/>
+          <p:cNvSpPr txBox="1"/>
+          <p:nvPr/>
+        </p:nvSpPr>
+        <p:spPr>
+          <a:xfrm>
+            <a:off x="2131832" y="2717022"/>
+            <a:ext cx="6517862" cy="307777"/>
+          </a:xfrm>
+          <a:prstGeom prst="rect">
+            <a:avLst/>
+          </a:prstGeom>
+          <a:noFill/>
+        </p:spPr>
+        <p:txBody>
+          <a:bodyPr wrap="square" rtlCol="0">
+            <a:spAutoFit/>
+          </a:bodyPr>
+          <a:lstStyle/>
+          <a:p>
+            <a:r>
+              <a:rPr lang="en-US" sz="1400" dirty="0" smtClean="0">
+                <a:solidFill>
+                  <a:schemeClr val="accent3">
+                    <a:lumMod val="50000"/>
+                  </a:schemeClr>
+                </a:solidFill>
+              </a:rPr>
+              <a:t>***Immediate mode so Source is the PC (i.e. 0000)</a:t>
+            </a:r>
+            <a:endParaRPr lang="en-US" sz="1400" dirty="0">
+              <a:solidFill>
+                <a:schemeClr val="accent3">
+                  <a:lumMod val="50000"/>
+                </a:schemeClr>
+              </a:solidFill>
+            </a:endParaRPr>
+          </a:p>
+        </p:txBody>
+      </p:sp>
       <p:grpSp>
         <p:nvGrpSpPr>
-          <p:cNvPr id="25" name="Group 24"/>
+          <p:cNvPr id="48" name="Group 47"/>
           <p:cNvGrpSpPr/>
           <p:nvPr/>
         </p:nvGrpSpPr>
         <p:grpSpPr>
           <a:xfrm>
-            <a:off x="1381538" y="1836069"/>
-            <a:ext cx="6517862" cy="4168745"/>
-            <a:chOff x="1381538" y="1836069"/>
-            <a:chExt cx="6517862" cy="4168745"/>
+            <a:off x="2421467" y="1467313"/>
+            <a:ext cx="4455141" cy="4537501"/>
+            <a:chOff x="2421467" y="1467313"/>
+            <a:chExt cx="4455141" cy="4537501"/>
           </a:xfrm>
         </p:grpSpPr>
-        <p:sp>
-          <p:nvSpPr>
-            <p:cNvPr id="26" name="TextBox 25"/>
-            <p:cNvSpPr txBox="1"/>
-            <p:nvPr/>
-          </p:nvSpPr>
-          <p:spPr>
-            <a:xfrm>
-              <a:off x="1381538" y="3727563"/>
-              <a:ext cx="6517862" cy="461665"/>
-            </a:xfrm>
-            <a:prstGeom prst="rect">
-              <a:avLst/>
-            </a:prstGeom>
-            <a:noFill/>
-          </p:spPr>
-          <p:txBody>
-            <a:bodyPr wrap="square" rtlCol="0">
-              <a:spAutoFit/>
-            </a:bodyPr>
-            <a:lstStyle/>
-            <a:p>
-              <a:r>
-                <a:rPr lang="en-US" dirty="0" smtClean="0">
-                  <a:solidFill>
-                    <a:srgbClr val="FFC000"/>
-                  </a:solidFill>
-                </a:rPr>
-                <a:t>Immediate mode so Source is the PC (i.e. 0000)</a:t>
-              </a:r>
-              <a:endParaRPr lang="en-US" dirty="0">
-                <a:solidFill>
-                  <a:srgbClr val="FFC000"/>
-                </a:solidFill>
-              </a:endParaRPr>
-            </a:p>
-          </p:txBody>
-        </p:sp>
         <p:sp>
           <p:nvSpPr>
             <p:cNvPr id="27" name="Oval 26"/>
@@ -28211,15 +29938,14 @@
           <p:nvCxnSpPr>
             <p:cNvPr id="30" name="Straight Arrow Connector 29"/>
             <p:cNvCxnSpPr>
-              <a:stCxn id="27" idx="3"/>
-              <a:endCxn id="26" idx="0"/>
+              <a:stCxn id="27" idx="7"/>
             </p:cNvCxnSpPr>
             <p:nvPr/>
           </p:nvCxnSpPr>
           <p:spPr bwMode="auto">
-            <a:xfrm flipH="1">
-              <a:off x="4640469" y="2710155"/>
-              <a:ext cx="1519262" cy="1017408"/>
+            <a:xfrm flipV="1">
+              <a:off x="6753611" y="1467313"/>
+              <a:ext cx="122996" cy="883701"/>
             </a:xfrm>
             <a:prstGeom prst="straightConnector1">
               <a:avLst/>
@@ -28854,7 +30580,7 @@
                             </p:stCondLst>
                             <p:childTnLst>
                               <p:par>
-                                <p:cTn id="13" presetID="1" presetClass="entr" presetSubtype="0" fill="hold" nodeType="clickEffect">
+                                <p:cTn id="13" presetID="1" presetClass="exit" presetSubtype="0" fill="hold" nodeType="clickEffect">
                                   <p:stCondLst>
                                     <p:cond delay="0"/>
                                   </p:stCondLst>
@@ -28867,7 +30593,34 @@
                                           </p:stCondLst>
                                         </p:cTn>
                                         <p:tgtEl>
-                                          <p:spTgt spid="25"/>
+                                          <p:spTgt spid="42"/>
+                                        </p:tgtEl>
+                                        <p:attrNameLst>
+                                          <p:attrName>style.visibility</p:attrName>
+                                        </p:attrNameLst>
+                                      </p:cBhvr>
+                                      <p:to>
+                                        <p:strVal val="hidden"/>
+                                      </p:to>
+                                    </p:set>
+                                  </p:childTnLst>
+                                </p:cTn>
+                              </p:par>
+                              <p:par>
+                                <p:cTn id="15" presetID="1" presetClass="entr" presetSubtype="0" fill="hold" grpId="0" nodeType="withEffect">
+                                  <p:stCondLst>
+                                    <p:cond delay="0"/>
+                                  </p:stCondLst>
+                                  <p:childTnLst>
+                                    <p:set>
+                                      <p:cBhvr>
+                                        <p:cTn id="16" dur="1" fill="hold">
+                                          <p:stCondLst>
+                                            <p:cond delay="0"/>
+                                          </p:stCondLst>
+                                        </p:cTn>
+                                        <p:tgtEl>
+                                          <p:spTgt spid="26"/>
                                         </p:tgtEl>
                                         <p:attrNameLst>
                                           <p:attrName>style.visibility</p:attrName>
@@ -28887,26 +30640,26 @@
                     </p:cTn>
                   </p:par>
                   <p:par>
-                    <p:cTn id="15" fill="hold">
+                    <p:cTn id="17" fill="hold">
                       <p:stCondLst>
                         <p:cond delay="indefinite"/>
                       </p:stCondLst>
                       <p:childTnLst>
                         <p:par>
-                          <p:cTn id="16" fill="hold">
+                          <p:cTn id="18" fill="hold">
                             <p:stCondLst>
                               <p:cond delay="0"/>
                             </p:stCondLst>
                             <p:childTnLst>
                               <p:par>
-                                <p:cTn id="17" presetID="1" presetClass="entr" presetSubtype="0" fill="hold" nodeType="clickEffect">
+                                <p:cTn id="19" presetID="1" presetClass="entr" presetSubtype="0" fill="hold" nodeType="clickEffect">
                                   <p:stCondLst>
                                     <p:cond delay="0"/>
                                   </p:stCondLst>
                                   <p:childTnLst>
                                     <p:set>
                                       <p:cBhvr>
-                                        <p:cTn id="18" dur="1" fill="hold">
+                                        <p:cTn id="20" dur="1" fill="hold">
                                           <p:stCondLst>
                                             <p:cond delay="0"/>
                                           </p:stCondLst>
@@ -28932,26 +30685,26 @@
                     </p:cTn>
                   </p:par>
                   <p:par>
-                    <p:cTn id="19" fill="hold">
+                    <p:cTn id="21" fill="hold">
                       <p:stCondLst>
                         <p:cond delay="indefinite"/>
                       </p:stCondLst>
                       <p:childTnLst>
                         <p:par>
-                          <p:cTn id="20" fill="hold">
+                          <p:cTn id="22" fill="hold">
                             <p:stCondLst>
                               <p:cond delay="0"/>
                             </p:stCondLst>
                             <p:childTnLst>
                               <p:par>
-                                <p:cTn id="21" presetID="1" presetClass="entr" presetSubtype="0" fill="hold" nodeType="clickEffect">
+                                <p:cTn id="23" presetID="1" presetClass="entr" presetSubtype="0" fill="hold" nodeType="clickEffect">
                                   <p:stCondLst>
                                     <p:cond delay="0"/>
                                   </p:stCondLst>
                                   <p:childTnLst>
                                     <p:set>
                                       <p:cBhvr>
-                                        <p:cTn id="22" dur="1" fill="hold">
+                                        <p:cTn id="24" dur="1" fill="hold">
                                           <p:stCondLst>
                                             <p:cond delay="0"/>
                                           </p:stCondLst>
@@ -28977,26 +30730,71 @@
                     </p:cTn>
                   </p:par>
                   <p:par>
-                    <p:cTn id="23" fill="hold">
+                    <p:cTn id="25" fill="hold">
                       <p:stCondLst>
                         <p:cond delay="indefinite"/>
                       </p:stCondLst>
                       <p:childTnLst>
                         <p:par>
-                          <p:cTn id="24" fill="hold">
+                          <p:cTn id="26" fill="hold">
                             <p:stCondLst>
                               <p:cond delay="0"/>
                             </p:stCondLst>
                             <p:childTnLst>
                               <p:par>
-                                <p:cTn id="25" presetID="1" presetClass="entr" presetSubtype="0" fill="hold" nodeType="clickEffect">
+                                <p:cTn id="27" presetID="1" presetClass="entr" presetSubtype="0" fill="hold" nodeType="clickEffect">
                                   <p:stCondLst>
                                     <p:cond delay="0"/>
                                   </p:stCondLst>
                                   <p:childTnLst>
                                     <p:set>
                                       <p:cBhvr>
-                                        <p:cTn id="26" dur="1" fill="hold">
+                                        <p:cTn id="28" dur="1" fill="hold">
+                                          <p:stCondLst>
+                                            <p:cond delay="0"/>
+                                          </p:stCondLst>
+                                        </p:cTn>
+                                        <p:tgtEl>
+                                          <p:spTgt spid="48"/>
+                                        </p:tgtEl>
+                                        <p:attrNameLst>
+                                          <p:attrName>style.visibility</p:attrName>
+                                        </p:attrNameLst>
+                                      </p:cBhvr>
+                                      <p:to>
+                                        <p:strVal val="visible"/>
+                                      </p:to>
+                                    </p:set>
+                                  </p:childTnLst>
+                                </p:cTn>
+                              </p:par>
+                            </p:childTnLst>
+                          </p:cTn>
+                        </p:par>
+                      </p:childTnLst>
+                    </p:cTn>
+                  </p:par>
+                  <p:par>
+                    <p:cTn id="29" fill="hold">
+                      <p:stCondLst>
+                        <p:cond delay="indefinite"/>
+                      </p:stCondLst>
+                      <p:childTnLst>
+                        <p:par>
+                          <p:cTn id="30" fill="hold">
+                            <p:stCondLst>
+                              <p:cond delay="0"/>
+                            </p:stCondLst>
+                            <p:childTnLst>
+                              <p:par>
+                                <p:cTn id="31" presetID="1" presetClass="entr" presetSubtype="0" fill="hold" nodeType="clickEffect">
+                                  <p:stCondLst>
+                                    <p:cond delay="0"/>
+                                  </p:stCondLst>
+                                  <p:childTnLst>
+                                    <p:set>
+                                      <p:cBhvr>
+                                        <p:cTn id="32" dur="1" fill="hold">
                                           <p:stCondLst>
                                             <p:cond delay="0"/>
                                           </p:stCondLst>
@@ -29042,6 +30840,9 @@
         </p:cTn>
       </p:par>
     </p:tnLst>
+    <p:bldLst>
+      <p:bldP spid="26" grpId="0"/>
+    </p:bldLst>
   </p:timing>
 </p:sld>
 </file>
@@ -30846,6 +32647,44 @@
           </a:graphicData>
         </a:graphic>
       </p:graphicFrame>
+      <p:sp>
+        <p:nvSpPr>
+          <p:cNvPr id="3" name="TextBox 2"/>
+          <p:cNvSpPr txBox="1"/>
+          <p:nvPr/>
+        </p:nvSpPr>
+        <p:spPr>
+          <a:xfrm>
+            <a:off x="2624667" y="4622800"/>
+            <a:ext cx="4910667" cy="461665"/>
+          </a:xfrm>
+          <a:prstGeom prst="rect">
+            <a:avLst/>
+          </a:prstGeom>
+          <a:noFill/>
+        </p:spPr>
+        <p:txBody>
+          <a:bodyPr wrap="square" rtlCol="0">
+            <a:spAutoFit/>
+          </a:bodyPr>
+          <a:lstStyle/>
+          <a:p>
+            <a:r>
+              <a:rPr lang="en-US" dirty="0" smtClean="0"/>
+              <a:t>Table 3-3 Blue Book </a:t>
+            </a:r>
+            <a:r>
+              <a:rPr lang="en-US" dirty="0" err="1" smtClean="0"/>
+              <a:t>Pg</a:t>
+            </a:r>
+            <a:r>
+              <a:rPr lang="en-US" dirty="0" smtClean="0"/>
+              <a:t> 12</a:t>
+            </a:r>
+            <a:endParaRPr lang="en-US" dirty="0"/>
+          </a:p>
+        </p:txBody>
+      </p:sp>
     </p:spTree>
     <p:extLst>
       <p:ext uri="{BB962C8B-B14F-4D97-AF65-F5344CB8AC3E}">
@@ -35968,7 +37807,7 @@
             <p:ph idx="1"/>
             <p:extLst>
               <p:ext uri="{D42A27DB-BD31-4B8C-83A1-F6EECF244321}">
-                <p14:modId xmlns:p14="http://schemas.microsoft.com/office/powerpoint/2010/main" val="1726622199"/>
+                <p14:modId xmlns:p14="http://schemas.microsoft.com/office/powerpoint/2010/main" val="1734931260"/>
               </p:ext>
             </p:extLst>
           </p:nvPr>
@@ -37299,7 +39138,34 @@
                         <a:rPr lang="en-US" sz="1600" dirty="0">
                           <a:effectLst/>
                         </a:rPr>
-                        <a:t>Pop SP, then pop PC. Note that because flags like CPUOFF are in the stored status register, the CPU will normally return to the low-power mode it was previously in. This can be changed by adjusting the SR value stored on the stack before invoking RETI (see below). The operand field is unused.</a:t>
+                        <a:t>Pop </a:t>
+                      </a:r>
+                      <a:r>
+                        <a:rPr lang="en-US" sz="1600" dirty="0" smtClean="0">
+                          <a:effectLst/>
+                        </a:rPr>
+                        <a:t>S</a:t>
+                      </a:r>
+                      <a:r>
+                        <a:rPr lang="en-US" sz="1600" dirty="0" smtClean="0">
+                          <a:solidFill>
+                            <a:srgbClr val="FF0000"/>
+                          </a:solidFill>
+                          <a:effectLst/>
+                        </a:rPr>
+                        <a:t>R</a:t>
+                      </a:r>
+                      <a:r>
+                        <a:rPr lang="en-US" sz="1600" dirty="0" smtClean="0">
+                          <a:effectLst/>
+                        </a:rPr>
+                        <a:t>, </a:t>
+                      </a:r>
+                      <a:r>
+                        <a:rPr lang="en-US" sz="1600" dirty="0">
+                          <a:effectLst/>
+                        </a:rPr>
+                        <a:t>then pop PC. Note that because flags like CPUOFF are in the stored status register, the CPU will normally return to the low-power mode it was previously in. This can be changed by adjusting the SR value stored on the stack before invoking RETI (see below). The operand field is unused.</a:t>
                       </a:r>
                     </a:p>
                   </a:txBody>
@@ -37694,7 +39560,7 @@
             <p:ph idx="1"/>
             <p:extLst>
               <p:ext uri="{D42A27DB-BD31-4B8C-83A1-F6EECF244321}">
-                <p14:modId xmlns:p14="http://schemas.microsoft.com/office/powerpoint/2010/main" val="3217466204"/>
+                <p14:modId xmlns:p14="http://schemas.microsoft.com/office/powerpoint/2010/main" val="2581681895"/>
               </p:ext>
             </p:extLst>
           </p:nvPr>
@@ -38342,10 +40208,34 @@
                     <a:p>
                       <a:pPr algn="l" fontAlgn="t"/>
                       <a:r>
-                        <a:rPr lang="en-US" sz="1600">
+                        <a:rPr lang="en-US" sz="1600" dirty="0">
                           <a:effectLst/>
                         </a:rPr>
-                        <a:t>Jump if C==0 (if unsigned &lt;)</a:t>
+                        <a:t>Jump if C==0 (</a:t>
+                      </a:r>
+                      <a:r>
+                        <a:rPr lang="en-US" sz="1600" b="1" dirty="0">
+                          <a:effectLst/>
+                        </a:rPr>
+                        <a:t>if </a:t>
+                      </a:r>
+                      <a:r>
+                        <a:rPr lang="en-US" sz="1600" b="1" u="sng" dirty="0">
+                          <a:effectLst/>
+                        </a:rPr>
+                        <a:t>unsigned</a:t>
+                      </a:r>
+                      <a:r>
+                        <a:rPr lang="en-US" sz="1600" b="1" dirty="0">
+                          <a:effectLst/>
+                        </a:rPr>
+                        <a:t> &lt;</a:t>
+                      </a:r>
+                      <a:r>
+                        <a:rPr lang="en-US" sz="1600" dirty="0">
+                          <a:effectLst/>
+                        </a:rPr>
+                        <a:t>)</a:t>
                       </a:r>
                     </a:p>
                   </a:txBody>
@@ -38512,10 +40402,34 @@
                     <a:p>
                       <a:pPr algn="l" fontAlgn="t"/>
                       <a:r>
-                        <a:rPr lang="en-US" sz="1600">
+                        <a:rPr lang="en-US" sz="1600" dirty="0">
                           <a:effectLst/>
                         </a:rPr>
-                        <a:t>Jump if C==1 (if unsigned &gt;)</a:t>
+                        <a:t>Jump if C==1 (</a:t>
+                      </a:r>
+                      <a:r>
+                        <a:rPr lang="en-US" sz="1600" b="1" dirty="0">
+                          <a:effectLst/>
+                        </a:rPr>
+                        <a:t>if </a:t>
+                      </a:r>
+                      <a:r>
+                        <a:rPr lang="en-US" sz="1600" b="1" u="sng" dirty="0">
+                          <a:effectLst/>
+                        </a:rPr>
+                        <a:t>unsigned</a:t>
+                      </a:r>
+                      <a:r>
+                        <a:rPr lang="en-US" sz="1600" b="1" dirty="0">
+                          <a:effectLst/>
+                        </a:rPr>
+                        <a:t> &gt;</a:t>
+                      </a:r>
+                      <a:r>
+                        <a:rPr lang="en-US" sz="1600" dirty="0">
+                          <a:effectLst/>
+                        </a:rPr>
+                        <a:t>)</a:t>
                       </a:r>
                     </a:p>
                   </a:txBody>
@@ -38852,10 +40766,34 @@
                     <a:p>
                       <a:pPr algn="l" fontAlgn="t"/>
                       <a:r>
-                        <a:rPr lang="en-US" sz="1600">
+                        <a:rPr lang="en-US" sz="1600" dirty="0">
                           <a:effectLst/>
                         </a:rPr>
-                        <a:t>Jump if N==V (if signed &gt;=)</a:t>
+                        <a:t>Jump if N==V (</a:t>
+                      </a:r>
+                      <a:r>
+                        <a:rPr lang="en-US" sz="1600" b="1" dirty="0">
+                          <a:effectLst/>
+                        </a:rPr>
+                        <a:t>if </a:t>
+                      </a:r>
+                      <a:r>
+                        <a:rPr lang="en-US" sz="1600" b="1" u="sng" dirty="0">
+                          <a:effectLst/>
+                        </a:rPr>
+                        <a:t>signed</a:t>
+                      </a:r>
+                      <a:r>
+                        <a:rPr lang="en-US" sz="1600" b="1" dirty="0">
+                          <a:effectLst/>
+                        </a:rPr>
+                        <a:t> &gt;=</a:t>
+                      </a:r>
+                      <a:r>
+                        <a:rPr lang="en-US" sz="1600" dirty="0">
+                          <a:effectLst/>
+                        </a:rPr>
+                        <a:t>)</a:t>
                       </a:r>
                     </a:p>
                   </a:txBody>
@@ -39022,10 +40960,34 @@
                     <a:p>
                       <a:pPr algn="l" fontAlgn="t"/>
                       <a:r>
-                        <a:rPr lang="en-US" sz="1600">
+                        <a:rPr lang="en-US" sz="1600" dirty="0">
                           <a:effectLst/>
                         </a:rPr>
-                        <a:t>Jump if N!=V (if signed &lt;)</a:t>
+                        <a:t>Jump if N!=V (</a:t>
+                      </a:r>
+                      <a:r>
+                        <a:rPr lang="en-US" sz="1600" b="1" dirty="0">
+                          <a:effectLst/>
+                        </a:rPr>
+                        <a:t>if </a:t>
+                      </a:r>
+                      <a:r>
+                        <a:rPr lang="en-US" sz="1600" b="1" u="sng" dirty="0">
+                          <a:effectLst/>
+                        </a:rPr>
+                        <a:t>signed</a:t>
+                      </a:r>
+                      <a:r>
+                        <a:rPr lang="en-US" sz="1600" b="1" dirty="0">
+                          <a:effectLst/>
+                        </a:rPr>
+                        <a:t> &lt;</a:t>
+                      </a:r>
+                      <a:r>
+                        <a:rPr lang="en-US" sz="1600" dirty="0">
+                          <a:effectLst/>
+                        </a:rPr>
+                        <a:t>)</a:t>
                       </a:r>
                     </a:p>
                   </a:txBody>

</xml_diff>